<commit_message>
Update projects and add presentation
</commit_message>
<xml_diff>
--- a/apresentacao/CSharp9_NET5.pptx
+++ b/apresentacao/CSharp9_NET5.pptx
@@ -247,7 +247,7 @@
           <a:p>
             <a:fld id="{8009DF05-DDEF-4388-8B66-D92E186C11BC}" type="datetimeFigureOut">
               <a:rPr lang="pt-BR" smtClean="0"/>
-              <a:t>08/09/2020</a:t>
+              <a:t>28/09/2020</a:t>
             </a:fld>
             <a:endParaRPr lang="pt-BR"/>
           </a:p>
@@ -417,7 +417,7 @@
           <a:p>
             <a:fld id="{8009DF05-DDEF-4388-8B66-D92E186C11BC}" type="datetimeFigureOut">
               <a:rPr lang="pt-BR" smtClean="0"/>
-              <a:t>08/09/2020</a:t>
+              <a:t>28/09/2020</a:t>
             </a:fld>
             <a:endParaRPr lang="pt-BR"/>
           </a:p>
@@ -597,7 +597,7 @@
           <a:p>
             <a:fld id="{8009DF05-DDEF-4388-8B66-D92E186C11BC}" type="datetimeFigureOut">
               <a:rPr lang="pt-BR" smtClean="0"/>
-              <a:t>08/09/2020</a:t>
+              <a:t>28/09/2020</a:t>
             </a:fld>
             <a:endParaRPr lang="pt-BR"/>
           </a:p>
@@ -767,7 +767,7 @@
           <a:p>
             <a:fld id="{8009DF05-DDEF-4388-8B66-D92E186C11BC}" type="datetimeFigureOut">
               <a:rPr lang="pt-BR" smtClean="0"/>
-              <a:t>08/09/2020</a:t>
+              <a:t>28/09/2020</a:t>
             </a:fld>
             <a:endParaRPr lang="pt-BR"/>
           </a:p>
@@ -1013,7 +1013,7 @@
           <a:p>
             <a:fld id="{8009DF05-DDEF-4388-8B66-D92E186C11BC}" type="datetimeFigureOut">
               <a:rPr lang="pt-BR" smtClean="0"/>
-              <a:t>08/09/2020</a:t>
+              <a:t>28/09/2020</a:t>
             </a:fld>
             <a:endParaRPr lang="pt-BR"/>
           </a:p>
@@ -1245,7 +1245,7 @@
           <a:p>
             <a:fld id="{8009DF05-DDEF-4388-8B66-D92E186C11BC}" type="datetimeFigureOut">
               <a:rPr lang="pt-BR" smtClean="0"/>
-              <a:t>08/09/2020</a:t>
+              <a:t>28/09/2020</a:t>
             </a:fld>
             <a:endParaRPr lang="pt-BR"/>
           </a:p>
@@ -1612,7 +1612,7 @@
           <a:p>
             <a:fld id="{8009DF05-DDEF-4388-8B66-D92E186C11BC}" type="datetimeFigureOut">
               <a:rPr lang="pt-BR" smtClean="0"/>
-              <a:t>08/09/2020</a:t>
+              <a:t>28/09/2020</a:t>
             </a:fld>
             <a:endParaRPr lang="pt-BR"/>
           </a:p>
@@ -1730,7 +1730,7 @@
           <a:p>
             <a:fld id="{8009DF05-DDEF-4388-8B66-D92E186C11BC}" type="datetimeFigureOut">
               <a:rPr lang="pt-BR" smtClean="0"/>
-              <a:t>08/09/2020</a:t>
+              <a:t>28/09/2020</a:t>
             </a:fld>
             <a:endParaRPr lang="pt-BR"/>
           </a:p>
@@ -1825,7 +1825,7 @@
           <a:p>
             <a:fld id="{8009DF05-DDEF-4388-8B66-D92E186C11BC}" type="datetimeFigureOut">
               <a:rPr lang="pt-BR" smtClean="0"/>
-              <a:t>08/09/2020</a:t>
+              <a:t>28/09/2020</a:t>
             </a:fld>
             <a:endParaRPr lang="pt-BR"/>
           </a:p>
@@ -2102,7 +2102,7 @@
           <a:p>
             <a:fld id="{8009DF05-DDEF-4388-8B66-D92E186C11BC}" type="datetimeFigureOut">
               <a:rPr lang="pt-BR" smtClean="0"/>
-              <a:t>08/09/2020</a:t>
+              <a:t>28/09/2020</a:t>
             </a:fld>
             <a:endParaRPr lang="pt-BR"/>
           </a:p>
@@ -2355,7 +2355,7 @@
           <a:p>
             <a:fld id="{8009DF05-DDEF-4388-8B66-D92E186C11BC}" type="datetimeFigureOut">
               <a:rPr lang="pt-BR" smtClean="0"/>
-              <a:t>08/09/2020</a:t>
+              <a:t>28/09/2020</a:t>
             </a:fld>
             <a:endParaRPr lang="pt-BR"/>
           </a:p>
@@ -2568,7 +2568,7 @@
           <a:p>
             <a:fld id="{8009DF05-DDEF-4388-8B66-D92E186C11BC}" type="datetimeFigureOut">
               <a:rPr lang="pt-BR" smtClean="0"/>
-              <a:t>08/09/2020</a:t>
+              <a:t>28/09/2020</a:t>
             </a:fld>
             <a:endParaRPr lang="pt-BR"/>
           </a:p>
@@ -3142,7 +3142,7 @@
         </p:nvSpPr>
         <p:spPr>
           <a:xfrm>
-            <a:off x="248690" y="142657"/>
+            <a:off x="3225155" y="142656"/>
             <a:ext cx="5771110" cy="1057709"/>
           </a:xfrm>
         </p:spPr>
@@ -3437,8 +3437,8 @@
         </p:blipFill>
         <p:spPr>
           <a:xfrm>
-            <a:off x="409575" y="430906"/>
-            <a:ext cx="11541517" cy="6150869"/>
+            <a:off x="128568" y="251927"/>
+            <a:ext cx="11859847" cy="6320518"/>
           </a:xfrm>
           <a:prstGeom prst="rect">
             <a:avLst/>
@@ -3571,8 +3571,8 @@
         </p:blipFill>
         <p:spPr>
           <a:xfrm>
-            <a:off x="1257299" y="502145"/>
-            <a:ext cx="9934575" cy="5898653"/>
+            <a:off x="-90905" y="-270588"/>
+            <a:ext cx="12282905" cy="7292973"/>
           </a:xfrm>
           <a:prstGeom prst="rect">
             <a:avLst/>

</xml_diff>